<commit_message>
Fix missing data coding issue
</commit_message>
<xml_diff>
--- a/Chapter 7 - internal meta-analysis/3_outputs/3_mediation_plot/Figure with cov arrow.pptx
+++ b/Chapter 7 - internal meta-analysis/3_outputs/3_mediation_plot/Figure with cov arrow.pptx
@@ -3349,10 +3349,10 @@
       </p:grpSpPr>
       <p:pic>
         <p:nvPicPr>
-          <p:cNvPr id="3" name="Picture 2">
-            <a:extLst>
-              <a:ext uri="{FF2B5EF4-FFF2-40B4-BE49-F238E27FC236}">
-                <a16:creationId xmlns:a16="http://schemas.microsoft.com/office/drawing/2014/main" id="{2A325AFF-6670-4933-951B-6B3EE715E55E}"/>
+          <p:cNvPr id="5" name="Picture 4">
+            <a:extLst>
+              <a:ext uri="{FF2B5EF4-FFF2-40B4-BE49-F238E27FC236}">
+                <a16:creationId xmlns:a16="http://schemas.microsoft.com/office/drawing/2014/main" id="{D54622AF-BC63-4C03-AE40-F8EF4071F793}"/>
               </a:ext>
             </a:extLst>
           </p:cNvPr>
@@ -3369,8 +3369,8 @@
         </p:blipFill>
         <p:spPr>
           <a:xfrm>
-            <a:off x="954450" y="1024381"/>
-            <a:ext cx="8973367" cy="4672522"/>
+            <a:off x="1204833" y="1288637"/>
+            <a:ext cx="8785009" cy="4280726"/>
           </a:xfrm>
           <a:prstGeom prst="rect">
             <a:avLst/>
@@ -3391,8 +3391,8 @@
         </p:nvSpPr>
         <p:spPr>
           <a:xfrm rot="21540000">
-            <a:off x="810542" y="1295215"/>
-            <a:ext cx="788584" cy="3988523"/>
+            <a:off x="1077940" y="1551982"/>
+            <a:ext cx="716895" cy="3687875"/>
           </a:xfrm>
           <a:custGeom>
             <a:avLst/>

</xml_diff>